<commit_message>
Update Web Project PowerPoint.pptx
</commit_message>
<xml_diff>
--- a/Project/Web Project PowerPoint.pptx
+++ b/Project/Web Project PowerPoint.pptx
@@ -5,7 +5,7 @@
     <p:sldMasterId id="2147483666" r:id="rId1"/>
   </p:sldMasterIdLst>
   <p:notesMasterIdLst>
-    <p:notesMasterId r:id="rId14"/>
+    <p:notesMasterId r:id="rId15"/>
   </p:notesMasterIdLst>
   <p:sldIdLst>
     <p:sldId id="256" r:id="rId2"/>
@@ -15,71 +15,72 @@
     <p:sldId id="261" r:id="rId6"/>
     <p:sldId id="262" r:id="rId7"/>
     <p:sldId id="263" r:id="rId8"/>
-    <p:sldId id="294" r:id="rId9"/>
-    <p:sldId id="295" r:id="rId10"/>
-    <p:sldId id="296" r:id="rId11"/>
-    <p:sldId id="264" r:id="rId12"/>
-    <p:sldId id="274" r:id="rId13"/>
+    <p:sldId id="297" r:id="rId9"/>
+    <p:sldId id="294" r:id="rId10"/>
+    <p:sldId id="295" r:id="rId11"/>
+    <p:sldId id="296" r:id="rId12"/>
+    <p:sldId id="264" r:id="rId13"/>
+    <p:sldId id="274" r:id="rId14"/>
   </p:sldIdLst>
   <p:sldSz cx="9144000" cy="5143500" type="screen16x9"/>
   <p:notesSz cx="6858000" cy="9144000"/>
   <p:embeddedFontLst>
     <p:embeddedFont>
       <p:font typeface="Bree Serif" panose="020B0604020202020204" charset="0"/>
-      <p:regular r:id="rId15"/>
+      <p:regular r:id="rId16"/>
     </p:embeddedFont>
     <p:embeddedFont>
       <p:font typeface="Calibri" panose="020F0502020204030204" pitchFamily="34" charset="0"/>
-      <p:regular r:id="rId16"/>
-      <p:bold r:id="rId17"/>
-      <p:italic r:id="rId18"/>
-      <p:boldItalic r:id="rId19"/>
+      <p:regular r:id="rId17"/>
+      <p:bold r:id="rId18"/>
+      <p:italic r:id="rId19"/>
+      <p:boldItalic r:id="rId20"/>
     </p:embeddedFont>
     <p:embeddedFont>
       <p:font typeface="Consolas" panose="020B0609020204030204" pitchFamily="49" charset="0"/>
-      <p:regular r:id="rId20"/>
-      <p:bold r:id="rId21"/>
-      <p:italic r:id="rId22"/>
-      <p:boldItalic r:id="rId23"/>
+      <p:regular r:id="rId21"/>
+      <p:bold r:id="rId22"/>
+      <p:italic r:id="rId23"/>
+      <p:boldItalic r:id="rId24"/>
     </p:embeddedFont>
     <p:embeddedFont>
       <p:font typeface="Didact Gothic" panose="00000500000000000000" pitchFamily="2" charset="0"/>
-      <p:regular r:id="rId24"/>
+      <p:regular r:id="rId25"/>
     </p:embeddedFont>
     <p:embeddedFont>
       <p:font typeface="Impact" panose="020B0806030902050204" pitchFamily="34" charset="0"/>
-      <p:regular r:id="rId25"/>
+      <p:regular r:id="rId26"/>
     </p:embeddedFont>
     <p:embeddedFont>
       <p:font typeface="Mangal" panose="02040503050203030202" pitchFamily="18" charset="0"/>
-      <p:regular r:id="rId26"/>
-      <p:bold r:id="rId27"/>
+      <p:regular r:id="rId27"/>
+      <p:bold r:id="rId28"/>
     </p:embeddedFont>
     <p:embeddedFont>
       <p:font typeface="Roboto Black" panose="02000000000000000000" pitchFamily="2" charset="0"/>
-      <p:bold r:id="rId28"/>
-      <p:boldItalic r:id="rId29"/>
+      <p:bold r:id="rId29"/>
+      <p:boldItalic r:id="rId30"/>
     </p:embeddedFont>
     <p:embeddedFont>
       <p:font typeface="Roboto Light" panose="02000000000000000000" pitchFamily="2" charset="0"/>
-      <p:regular r:id="rId30"/>
-      <p:bold r:id="rId31"/>
-      <p:italic r:id="rId32"/>
-      <p:boldItalic r:id="rId33"/>
+      <p:regular r:id="rId31"/>
+      <p:bold r:id="rId32"/>
+      <p:italic r:id="rId33"/>
+      <p:boldItalic r:id="rId34"/>
     </p:embeddedFont>
     <p:embeddedFont>
       <p:font typeface="Roboto Mono Thin" panose="020B0604020202020204" charset="0"/>
-      <p:regular r:id="rId34"/>
-      <p:bold r:id="rId35"/>
-      <p:italic r:id="rId36"/>
-      <p:boldItalic r:id="rId37"/>
+      <p:regular r:id="rId35"/>
+      <p:bold r:id="rId36"/>
+      <p:italic r:id="rId37"/>
+      <p:boldItalic r:id="rId38"/>
     </p:embeddedFont>
     <p:embeddedFont>
       <p:font typeface="Roboto Thin" panose="02000000000000000000" pitchFamily="2" charset="0"/>
-      <p:regular r:id="rId38"/>
-      <p:bold r:id="rId39"/>
-      <p:italic r:id="rId40"/>
-      <p:boldItalic r:id="rId41"/>
+      <p:regular r:id="rId39"/>
+      <p:bold r:id="rId40"/>
+      <p:italic r:id="rId41"/>
+      <p:boldItalic r:id="rId42"/>
     </p:embeddedFont>
   </p:embeddedFontLst>
   <p:defaultTextStyle>
@@ -311,6 +312,11 @@
       </a:defRPr>
     </a:lvl9pPr>
   </p:defaultTextStyle>
+  <p:extLst>
+    <p:ext uri="{EFAFB233-063F-42B5-8137-9DF3F51BA10A}">
+      <p15:sldGuideLst xmlns:p15="http://schemas.microsoft.com/office/powerpoint/2012/main"/>
+    </p:ext>
+  </p:extLst>
 </p:presentation>
 </file>
 
@@ -958,6 +964,115 @@
     </p:spTree>
     <p:extLst>
       <p:ext uri="{BB962C8B-B14F-4D97-AF65-F5344CB8AC3E}">
+        <p14:creationId xmlns:p14="http://schemas.microsoft.com/office/powerpoint/2010/main" val="1660696842"/>
+      </p:ext>
+    </p:extLst>
+  </p:cSld>
+  <p:clrMapOvr>
+    <a:masterClrMapping/>
+  </p:clrMapOvr>
+</p:notes>
+</file>
+
+<file path=ppt/notesSlides/notesSlide11.xml><?xml version="1.0" encoding="utf-8"?>
+<p:notes xmlns:a="http://schemas.openxmlformats.org/drawingml/2006/main" xmlns:r="http://schemas.openxmlformats.org/officeDocument/2006/relationships" xmlns:p="http://schemas.openxmlformats.org/presentationml/2006/main" showMasterSp="0" showMasterPhAnim="0">
+  <p:cSld>
+    <p:spTree>
+      <p:nvGrpSpPr>
+        <p:cNvPr id="1" name="Shape 442"/>
+        <p:cNvGrpSpPr/>
+        <p:nvPr/>
+      </p:nvGrpSpPr>
+      <p:grpSpPr>
+        <a:xfrm>
+          <a:off x="0" y="0"/>
+          <a:ext cx="0" cy="0"/>
+          <a:chOff x="0" y="0"/>
+          <a:chExt cx="0" cy="0"/>
+        </a:xfrm>
+      </p:grpSpPr>
+      <p:sp>
+        <p:nvSpPr>
+          <p:cNvPr id="443" name="Google Shape;443;g5dc4e38d75_0_8:notes"/>
+          <p:cNvSpPr>
+            <a:spLocks noGrp="1" noRot="1" noChangeAspect="1"/>
+          </p:cNvSpPr>
+          <p:nvPr>
+            <p:ph type="sldImg" idx="2"/>
+          </p:nvPr>
+        </p:nvSpPr>
+        <p:spPr>
+          <a:xfrm>
+            <a:off x="381000" y="685800"/>
+            <a:ext cx="6096000" cy="3429000"/>
+          </a:xfrm>
+          <a:custGeom>
+            <a:avLst/>
+            <a:gdLst/>
+            <a:ahLst/>
+            <a:cxnLst/>
+            <a:rect l="l" t="t" r="r" b="b"/>
+            <a:pathLst>
+              <a:path w="120000" h="120000" extrusionOk="0">
+                <a:moveTo>
+                  <a:pt x="0" y="0"/>
+                </a:moveTo>
+                <a:lnTo>
+                  <a:pt x="120000" y="0"/>
+                </a:lnTo>
+                <a:lnTo>
+                  <a:pt x="120000" y="120000"/>
+                </a:lnTo>
+                <a:lnTo>
+                  <a:pt x="0" y="120000"/>
+                </a:lnTo>
+                <a:close/>
+              </a:path>
+            </a:pathLst>
+          </a:custGeom>
+        </p:spPr>
+      </p:sp>
+      <p:sp>
+        <p:nvSpPr>
+          <p:cNvPr id="444" name="Google Shape;444;g5dc4e38d75_0_8:notes"/>
+          <p:cNvSpPr txBox="1">
+            <a:spLocks noGrp="1"/>
+          </p:cNvSpPr>
+          <p:nvPr>
+            <p:ph type="body" idx="1"/>
+          </p:nvPr>
+        </p:nvSpPr>
+        <p:spPr>
+          <a:xfrm>
+            <a:off x="685800" y="4343400"/>
+            <a:ext cx="5486400" cy="4114800"/>
+          </a:xfrm>
+          <a:prstGeom prst="rect">
+            <a:avLst/>
+          </a:prstGeom>
+        </p:spPr>
+        <p:txBody>
+          <a:bodyPr spcFirstLastPara="1" wrap="square" lIns="91425" tIns="91425" rIns="91425" bIns="91425" anchor="t" anchorCtr="0">
+            <a:noAutofit/>
+          </a:bodyPr>
+          <a:lstStyle/>
+          <a:p>
+            <a:pPr marL="0" lvl="0" indent="0" algn="l" rtl="0">
+              <a:spcBef>
+                <a:spcPts val="0"/>
+              </a:spcBef>
+              <a:spcAft>
+                <a:spcPts val="0"/>
+              </a:spcAft>
+              <a:buNone/>
+            </a:pPr>
+            <a:endParaRPr/>
+          </a:p>
+        </p:txBody>
+      </p:sp>
+    </p:spTree>
+    <p:extLst>
+      <p:ext uri="{BB962C8B-B14F-4D97-AF65-F5344CB8AC3E}">
         <p14:creationId xmlns:p14="http://schemas.microsoft.com/office/powerpoint/2010/main" val="4284306223"/>
       </p:ext>
     </p:extLst>
@@ -968,7 +1083,7 @@
 </p:notes>
 </file>
 
-<file path=ppt/notesSlides/notesSlide11.xml><?xml version="1.0" encoding="utf-8"?>
+<file path=ppt/notesSlides/notesSlide12.xml><?xml version="1.0" encoding="utf-8"?>
 <p:notes xmlns:a="http://schemas.openxmlformats.org/drawingml/2006/main" xmlns:r="http://schemas.openxmlformats.org/officeDocument/2006/relationships" xmlns:p="http://schemas.openxmlformats.org/presentationml/2006/main" showMasterSp="0" showMasterPhAnim="0">
   <p:cSld>
     <p:spTree>
@@ -1072,7 +1187,7 @@
 </p:notes>
 </file>
 
-<file path=ppt/notesSlides/notesSlide12.xml><?xml version="1.0" encoding="utf-8"?>
+<file path=ppt/notesSlides/notesSlide13.xml><?xml version="1.0" encoding="utf-8"?>
 <p:notes xmlns:a="http://schemas.openxmlformats.org/drawingml/2006/main" xmlns:r="http://schemas.openxmlformats.org/officeDocument/2006/relationships" xmlns:p="http://schemas.openxmlformats.org/presentationml/2006/main" showMasterSp="0" showMasterPhAnim="0">
   <p:cSld>
     <p:spTree>
@@ -1899,7 +2014,7 @@
     </p:spTree>
     <p:extLst>
       <p:ext uri="{BB962C8B-B14F-4D97-AF65-F5344CB8AC3E}">
-        <p14:creationId xmlns:p14="http://schemas.microsoft.com/office/powerpoint/2010/main" val="4062984962"/>
+        <p14:creationId xmlns:p14="http://schemas.microsoft.com/office/powerpoint/2010/main" val="57857300"/>
       </p:ext>
     </p:extLst>
   </p:cSld>
@@ -2008,7 +2123,7 @@
     </p:spTree>
     <p:extLst>
       <p:ext uri="{BB962C8B-B14F-4D97-AF65-F5344CB8AC3E}">
-        <p14:creationId xmlns:p14="http://schemas.microsoft.com/office/powerpoint/2010/main" val="1660696842"/>
+        <p14:creationId xmlns:p14="http://schemas.microsoft.com/office/powerpoint/2010/main" val="4062984962"/>
       </p:ext>
     </p:extLst>
   </p:cSld>
@@ -20671,6 +20786,294 @@
         <p:spPr>
           <a:xfrm rot="10800000">
             <a:off x="5218442" y="1801936"/>
+            <a:ext cx="3267278" cy="1307024"/>
+          </a:xfrm>
+          <a:prstGeom prst="homePlate">
+            <a:avLst>
+              <a:gd name="adj" fmla="val 50000"/>
+            </a:avLst>
+          </a:prstGeom>
+          <a:solidFill>
+            <a:schemeClr val="accent1"/>
+          </a:solidFill>
+          <a:ln>
+            <a:noFill/>
+          </a:ln>
+        </p:spPr>
+        <p:txBody>
+          <a:bodyPr spcFirstLastPara="1" wrap="square" lIns="91425" tIns="91425" rIns="91425" bIns="91425" anchor="ctr" anchorCtr="0">
+            <a:noAutofit/>
+          </a:bodyPr>
+          <a:lstStyle/>
+          <a:p>
+            <a:pPr marL="0" lvl="0" indent="0" algn="l" rtl="0">
+              <a:spcBef>
+                <a:spcPts val="0"/>
+              </a:spcBef>
+              <a:spcAft>
+                <a:spcPts val="0"/>
+              </a:spcAft>
+              <a:buNone/>
+            </a:pPr>
+            <a:endParaRPr/>
+          </a:p>
+        </p:txBody>
+      </p:sp>
+      <p:sp>
+        <p:nvSpPr>
+          <p:cNvPr id="449" name="Google Shape;449;p29"/>
+          <p:cNvSpPr txBox="1">
+            <a:spLocks noGrp="1"/>
+          </p:cNvSpPr>
+          <p:nvPr>
+            <p:ph type="ctrTitle" idx="4"/>
+          </p:nvPr>
+        </p:nvSpPr>
+        <p:spPr>
+          <a:xfrm>
+            <a:off x="256200" y="637927"/>
+            <a:ext cx="7833900" cy="606600"/>
+          </a:xfrm>
+          <a:prstGeom prst="rect">
+            <a:avLst/>
+          </a:prstGeom>
+        </p:spPr>
+        <p:txBody>
+          <a:bodyPr spcFirstLastPara="1" wrap="square" lIns="91425" tIns="91425" rIns="91425" bIns="91425" anchor="b" anchorCtr="0">
+            <a:noAutofit/>
+          </a:bodyPr>
+          <a:lstStyle/>
+          <a:p>
+            <a:pPr marL="0" lvl="0" indent="0" algn="r" rtl="0">
+              <a:spcBef>
+                <a:spcPts val="0"/>
+              </a:spcBef>
+              <a:spcAft>
+                <a:spcPts val="0"/>
+              </a:spcAft>
+              <a:buNone/>
+            </a:pPr>
+            <a:r>
+              <a:rPr lang="es" dirty="0">
+                <a:solidFill>
+                  <a:srgbClr val="FFFFFF"/>
+                </a:solidFill>
+              </a:rPr>
+              <a:t>About Me Page</a:t>
+            </a:r>
+            <a:endParaRPr dirty="0">
+              <a:solidFill>
+                <a:srgbClr val="FFFFFF"/>
+              </a:solidFill>
+            </a:endParaRPr>
+          </a:p>
+        </p:txBody>
+      </p:sp>
+      <p:cxnSp>
+        <p:nvCxnSpPr>
+          <p:cNvPr id="458" name="Google Shape;458;p29"/>
+          <p:cNvCxnSpPr/>
+          <p:nvPr/>
+        </p:nvCxnSpPr>
+        <p:spPr>
+          <a:xfrm>
+            <a:off x="5882725" y="1195336"/>
+            <a:ext cx="3340500" cy="0"/>
+          </a:xfrm>
+          <a:prstGeom prst="straightConnector1">
+            <a:avLst/>
+          </a:prstGeom>
+          <a:noFill/>
+          <a:ln w="9525" cap="flat" cmpd="sng">
+            <a:solidFill>
+              <a:schemeClr val="accent1"/>
+            </a:solidFill>
+            <a:prstDash val="solid"/>
+            <a:round/>
+            <a:headEnd type="none" w="med" len="med"/>
+            <a:tailEnd type="none" w="med" len="med"/>
+          </a:ln>
+        </p:spPr>
+      </p:cxnSp>
+      <p:sp>
+        <p:nvSpPr>
+          <p:cNvPr id="558" name="Google Shape;558;p29"/>
+          <p:cNvSpPr txBox="1">
+            <a:spLocks noGrp="1"/>
+          </p:cNvSpPr>
+          <p:nvPr>
+            <p:ph type="ctrTitle" idx="3"/>
+          </p:nvPr>
+        </p:nvSpPr>
+        <p:spPr>
+          <a:xfrm>
+            <a:off x="6014100" y="2571750"/>
+            <a:ext cx="2076000" cy="196200"/>
+          </a:xfrm>
+          <a:prstGeom prst="rect">
+            <a:avLst/>
+          </a:prstGeom>
+        </p:spPr>
+        <p:txBody>
+          <a:bodyPr spcFirstLastPara="1" wrap="square" lIns="91425" tIns="91425" rIns="91425" bIns="91425" anchor="b" anchorCtr="0">
+            <a:noAutofit/>
+          </a:bodyPr>
+          <a:lstStyle/>
+          <a:p>
+            <a:pPr marL="0" lvl="0" indent="0" algn="l" rtl="0">
+              <a:spcBef>
+                <a:spcPts val="0"/>
+              </a:spcBef>
+              <a:spcAft>
+                <a:spcPts val="0"/>
+              </a:spcAft>
+              <a:buNone/>
+            </a:pPr>
+            <a:r>
+              <a:rPr lang="en-US" dirty="0">
+                <a:solidFill>
+                  <a:srgbClr val="0E2A47"/>
+                </a:solidFill>
+              </a:rPr>
+              <a:t>This page is my portfolio, It has all the important information about me </a:t>
+            </a:r>
+            <a:endParaRPr dirty="0">
+              <a:solidFill>
+                <a:srgbClr val="0E2A47"/>
+              </a:solidFill>
+            </a:endParaRPr>
+          </a:p>
+        </p:txBody>
+      </p:sp>
+      <p:pic>
+        <p:nvPicPr>
+          <p:cNvPr id="3" name="Picture 2">
+            <a:extLst>
+              <a:ext uri="{FF2B5EF4-FFF2-40B4-BE49-F238E27FC236}">
+                <a16:creationId xmlns:a16="http://schemas.microsoft.com/office/drawing/2014/main" id="{587C05D7-747A-DD6E-8E4D-F9A3D1E32CA4}"/>
+              </a:ext>
+            </a:extLst>
+          </p:cNvPr>
+          <p:cNvPicPr>
+            <a:picLocks noChangeAspect="1"/>
+          </p:cNvPicPr>
+          <p:nvPr/>
+        </p:nvPicPr>
+        <p:blipFill>
+          <a:blip r:embed="rId3"/>
+          <a:stretch>
+            <a:fillRect/>
+          </a:stretch>
+        </p:blipFill>
+        <p:spPr>
+          <a:xfrm>
+            <a:off x="256200" y="95943"/>
+            <a:ext cx="3957060" cy="1933823"/>
+          </a:xfrm>
+          <a:prstGeom prst="rect">
+            <a:avLst/>
+          </a:prstGeom>
+        </p:spPr>
+      </p:pic>
+      <p:pic>
+        <p:nvPicPr>
+          <p:cNvPr id="5" name="Picture 4">
+            <a:extLst>
+              <a:ext uri="{FF2B5EF4-FFF2-40B4-BE49-F238E27FC236}">
+                <a16:creationId xmlns:a16="http://schemas.microsoft.com/office/drawing/2014/main" id="{F2F4F789-EC04-66A2-AB23-BBFB70A9DDA1}"/>
+              </a:ext>
+            </a:extLst>
+          </p:cNvPr>
+          <p:cNvPicPr>
+            <a:picLocks noChangeAspect="1"/>
+          </p:cNvPicPr>
+          <p:nvPr/>
+        </p:nvPicPr>
+        <p:blipFill>
+          <a:blip r:embed="rId4"/>
+          <a:stretch>
+            <a:fillRect/>
+          </a:stretch>
+        </p:blipFill>
+        <p:spPr>
+          <a:xfrm>
+            <a:off x="256200" y="2029766"/>
+            <a:ext cx="3957060" cy="1947290"/>
+          </a:xfrm>
+          <a:prstGeom prst="rect">
+            <a:avLst/>
+          </a:prstGeom>
+        </p:spPr>
+      </p:pic>
+      <p:pic>
+        <p:nvPicPr>
+          <p:cNvPr id="7" name="Picture 6">
+            <a:extLst>
+              <a:ext uri="{FF2B5EF4-FFF2-40B4-BE49-F238E27FC236}">
+                <a16:creationId xmlns:a16="http://schemas.microsoft.com/office/drawing/2014/main" id="{2DAC0BE9-9D04-4DC5-D01F-A3061FA788BA}"/>
+              </a:ext>
+            </a:extLst>
+          </p:cNvPr>
+          <p:cNvPicPr>
+            <a:picLocks noChangeAspect="1"/>
+          </p:cNvPicPr>
+          <p:nvPr/>
+        </p:nvPicPr>
+        <p:blipFill>
+          <a:blip r:embed="rId5"/>
+          <a:stretch>
+            <a:fillRect/>
+          </a:stretch>
+        </p:blipFill>
+        <p:spPr>
+          <a:xfrm>
+            <a:off x="256200" y="3946598"/>
+            <a:ext cx="3957060" cy="1144260"/>
+          </a:xfrm>
+          <a:prstGeom prst="rect">
+            <a:avLst/>
+          </a:prstGeom>
+        </p:spPr>
+      </p:pic>
+    </p:spTree>
+    <p:extLst>
+      <p:ext uri="{BB962C8B-B14F-4D97-AF65-F5344CB8AC3E}">
+        <p14:creationId xmlns:p14="http://schemas.microsoft.com/office/powerpoint/2010/main" val="1517527258"/>
+      </p:ext>
+    </p:extLst>
+  </p:cSld>
+  <p:clrMapOvr>
+    <a:masterClrMapping/>
+  </p:clrMapOvr>
+</p:sld>
+</file>
+
+<file path=ppt/slides/slide11.xml><?xml version="1.0" encoding="utf-8"?>
+<p:sld xmlns:a="http://schemas.openxmlformats.org/drawingml/2006/main" xmlns:r="http://schemas.openxmlformats.org/officeDocument/2006/relationships" xmlns:p="http://schemas.openxmlformats.org/presentationml/2006/main">
+  <p:cSld>
+    <p:spTree>
+      <p:nvGrpSpPr>
+        <p:cNvPr id="1" name="Shape 445"/>
+        <p:cNvGrpSpPr/>
+        <p:nvPr/>
+      </p:nvGrpSpPr>
+      <p:grpSpPr>
+        <a:xfrm>
+          <a:off x="0" y="0"/>
+          <a:ext cx="0" cy="0"/>
+          <a:chOff x="0" y="0"/>
+          <a:chExt cx="0" cy="0"/>
+        </a:xfrm>
+      </p:grpSpPr>
+      <p:sp>
+        <p:nvSpPr>
+          <p:cNvPr id="447" name="Google Shape;447;p29"/>
+          <p:cNvSpPr/>
+          <p:nvPr/>
+        </p:nvSpPr>
+        <p:spPr>
+          <a:xfrm rot="10800000">
+            <a:off x="5218442" y="1801936"/>
             <a:ext cx="3267278" cy="1707847"/>
           </a:xfrm>
           <a:prstGeom prst="homePlate">
@@ -20903,7 +21306,7 @@
 </p:sld>
 </file>
 
-<file path=ppt/slides/slide11.xml><?xml version="1.0" encoding="utf-8"?>
+<file path=ppt/slides/slide12.xml><?xml version="1.0" encoding="utf-8"?>
 <p:sld xmlns:a="http://schemas.openxmlformats.org/drawingml/2006/main" xmlns:r="http://schemas.openxmlformats.org/officeDocument/2006/relationships" xmlns:p="http://schemas.openxmlformats.org/presentationml/2006/main">
   <p:cSld>
     <p:spTree>
@@ -23387,7 +23790,7 @@
 </p:sld>
 </file>
 
-<file path=ppt/slides/slide12.xml><?xml version="1.0" encoding="utf-8"?>
+<file path=ppt/slides/slide13.xml><?xml version="1.0" encoding="utf-8"?>
 <p:sld xmlns:a="http://schemas.openxmlformats.org/drawingml/2006/main" xmlns:r="http://schemas.openxmlformats.org/officeDocument/2006/relationships" xmlns:p="http://schemas.openxmlformats.org/presentationml/2006/main">
   <p:cSld>
     <p:bg>
@@ -43664,6 +44067,256 @@
       </p:grpSpPr>
       <p:sp>
         <p:nvSpPr>
+          <p:cNvPr id="447" name="Google Shape;447;p29"/>
+          <p:cNvSpPr/>
+          <p:nvPr/>
+        </p:nvSpPr>
+        <p:spPr>
+          <a:xfrm rot="10800000">
+            <a:off x="5218442" y="1801936"/>
+            <a:ext cx="3267278" cy="1707847"/>
+          </a:xfrm>
+          <a:prstGeom prst="homePlate">
+            <a:avLst>
+              <a:gd name="adj" fmla="val 50000"/>
+            </a:avLst>
+          </a:prstGeom>
+          <a:solidFill>
+            <a:schemeClr val="accent1"/>
+          </a:solidFill>
+          <a:ln>
+            <a:noFill/>
+          </a:ln>
+        </p:spPr>
+        <p:txBody>
+          <a:bodyPr spcFirstLastPara="1" wrap="square" lIns="91425" tIns="91425" rIns="91425" bIns="91425" anchor="ctr" anchorCtr="0">
+            <a:noAutofit/>
+          </a:bodyPr>
+          <a:lstStyle/>
+          <a:p>
+            <a:pPr marL="0" lvl="0" indent="0" algn="l" rtl="0">
+              <a:spcBef>
+                <a:spcPts val="0"/>
+              </a:spcBef>
+              <a:spcAft>
+                <a:spcPts val="0"/>
+              </a:spcAft>
+              <a:buNone/>
+            </a:pPr>
+            <a:endParaRPr/>
+          </a:p>
+        </p:txBody>
+      </p:sp>
+      <p:sp>
+        <p:nvSpPr>
+          <p:cNvPr id="449" name="Google Shape;449;p29"/>
+          <p:cNvSpPr txBox="1">
+            <a:spLocks noGrp="1"/>
+          </p:cNvSpPr>
+          <p:nvPr>
+            <p:ph type="ctrTitle" idx="4"/>
+          </p:nvPr>
+        </p:nvSpPr>
+        <p:spPr>
+          <a:xfrm>
+            <a:off x="655050" y="659844"/>
+            <a:ext cx="7833900" cy="606600"/>
+          </a:xfrm>
+          <a:prstGeom prst="rect">
+            <a:avLst/>
+          </a:prstGeom>
+        </p:spPr>
+        <p:txBody>
+          <a:bodyPr spcFirstLastPara="1" wrap="square" lIns="91425" tIns="91425" rIns="91425" bIns="91425" anchor="b" anchorCtr="0">
+            <a:noAutofit/>
+          </a:bodyPr>
+          <a:lstStyle/>
+          <a:p>
+            <a:pPr marL="0" lvl="0" indent="0" algn="r" rtl="0">
+              <a:spcBef>
+                <a:spcPts val="0"/>
+              </a:spcBef>
+              <a:spcAft>
+                <a:spcPts val="0"/>
+              </a:spcAft>
+              <a:buNone/>
+            </a:pPr>
+            <a:r>
+              <a:rPr lang="es">
+                <a:solidFill>
+                  <a:srgbClr val="FFFFFF"/>
+                </a:solidFill>
+              </a:rPr>
+              <a:t>Products </a:t>
+            </a:r>
+            <a:r>
+              <a:rPr lang="es" dirty="0">
+                <a:solidFill>
+                  <a:srgbClr val="FFFFFF"/>
+                </a:solidFill>
+              </a:rPr>
+              <a:t>Page</a:t>
+            </a:r>
+            <a:endParaRPr dirty="0">
+              <a:solidFill>
+                <a:srgbClr val="FFFFFF"/>
+              </a:solidFill>
+            </a:endParaRPr>
+          </a:p>
+        </p:txBody>
+      </p:sp>
+      <p:cxnSp>
+        <p:nvCxnSpPr>
+          <p:cNvPr id="458" name="Google Shape;458;p29"/>
+          <p:cNvCxnSpPr/>
+          <p:nvPr/>
+        </p:nvCxnSpPr>
+        <p:spPr>
+          <a:xfrm>
+            <a:off x="5882725" y="1195336"/>
+            <a:ext cx="3340500" cy="0"/>
+          </a:xfrm>
+          <a:prstGeom prst="straightConnector1">
+            <a:avLst/>
+          </a:prstGeom>
+          <a:noFill/>
+          <a:ln w="9525" cap="flat" cmpd="sng">
+            <a:solidFill>
+              <a:schemeClr val="accent1"/>
+            </a:solidFill>
+            <a:prstDash val="solid"/>
+            <a:round/>
+            <a:headEnd type="none" w="med" len="med"/>
+            <a:tailEnd type="none" w="med" len="med"/>
+          </a:ln>
+        </p:spPr>
+      </p:cxnSp>
+      <p:sp>
+        <p:nvSpPr>
+          <p:cNvPr id="558" name="Google Shape;558;p29"/>
+          <p:cNvSpPr txBox="1">
+            <a:spLocks noGrp="1"/>
+          </p:cNvSpPr>
+          <p:nvPr>
+            <p:ph type="ctrTitle" idx="3"/>
+          </p:nvPr>
+        </p:nvSpPr>
+        <p:spPr>
+          <a:xfrm>
+            <a:off x="6014100" y="2984560"/>
+            <a:ext cx="2076000" cy="196200"/>
+          </a:xfrm>
+          <a:prstGeom prst="rect">
+            <a:avLst/>
+          </a:prstGeom>
+        </p:spPr>
+        <p:txBody>
+          <a:bodyPr spcFirstLastPara="1" wrap="square" lIns="91425" tIns="91425" rIns="91425" bIns="91425" anchor="b" anchorCtr="0">
+            <a:noAutofit/>
+          </a:bodyPr>
+          <a:lstStyle/>
+          <a:p>
+            <a:pPr marL="0" lvl="0" indent="0" algn="l" rtl="0">
+              <a:spcBef>
+                <a:spcPts val="0"/>
+              </a:spcBef>
+              <a:spcAft>
+                <a:spcPts val="0"/>
+              </a:spcAft>
+              <a:buNone/>
+            </a:pPr>
+            <a:r>
+              <a:rPr lang="en-US" dirty="0">
+                <a:solidFill>
+                  <a:srgbClr val="0E2A47"/>
+                </a:solidFill>
+              </a:rPr>
+              <a:t>The products Page has three buttons, each button displays products from each section using JS. There are two pictures for the companies we deal </a:t>
+            </a:r>
+            <a:r>
+              <a:rPr lang="en-US" dirty="0" err="1">
+                <a:solidFill>
+                  <a:srgbClr val="0E2A47"/>
+                </a:solidFill>
+              </a:rPr>
+              <a:t>wtih</a:t>
+            </a:r>
+            <a:endParaRPr dirty="0">
+              <a:solidFill>
+                <a:srgbClr val="0E2A47"/>
+              </a:solidFill>
+            </a:endParaRPr>
+          </a:p>
+        </p:txBody>
+      </p:sp>
+      <p:pic>
+        <p:nvPicPr>
+          <p:cNvPr id="7" name="Picture 6" descr="Graphical user interface, website&#10;&#10;Description automatically generated">
+            <a:extLst>
+              <a:ext uri="{FF2B5EF4-FFF2-40B4-BE49-F238E27FC236}">
+                <a16:creationId xmlns:a16="http://schemas.microsoft.com/office/drawing/2014/main" id="{D480B69F-2B1B-FE29-8C79-569FE6C1CD20}"/>
+              </a:ext>
+            </a:extLst>
+          </p:cNvPr>
+          <p:cNvPicPr>
+            <a:picLocks noChangeAspect="1"/>
+          </p:cNvPicPr>
+          <p:nvPr/>
+        </p:nvPicPr>
+        <p:blipFill>
+          <a:blip r:embed="rId3" cstate="print">
+            <a:extLst>
+              <a:ext uri="{28A0092B-C50C-407E-A947-70E740481C1C}">
+                <a14:useLocalDpi xmlns:a14="http://schemas.microsoft.com/office/drawing/2010/main" val="0"/>
+              </a:ext>
+            </a:extLst>
+          </a:blip>
+          <a:stretch>
+            <a:fillRect/>
+          </a:stretch>
+        </p:blipFill>
+        <p:spPr>
+          <a:xfrm>
+            <a:off x="534363" y="1294076"/>
+            <a:ext cx="4286250" cy="2669540"/>
+          </a:xfrm>
+          <a:prstGeom prst="rect">
+            <a:avLst/>
+          </a:prstGeom>
+        </p:spPr>
+      </p:pic>
+    </p:spTree>
+    <p:extLst>
+      <p:ext uri="{BB962C8B-B14F-4D97-AF65-F5344CB8AC3E}">
+        <p14:creationId xmlns:p14="http://schemas.microsoft.com/office/powerpoint/2010/main" val="426970921"/>
+      </p:ext>
+    </p:extLst>
+  </p:cSld>
+  <p:clrMapOvr>
+    <a:masterClrMapping/>
+  </p:clrMapOvr>
+</p:sld>
+</file>
+
+<file path=ppt/slides/slide9.xml><?xml version="1.0" encoding="utf-8"?>
+<p:sld xmlns:a="http://schemas.openxmlformats.org/drawingml/2006/main" xmlns:r="http://schemas.openxmlformats.org/officeDocument/2006/relationships" xmlns:p="http://schemas.openxmlformats.org/presentationml/2006/main">
+  <p:cSld>
+    <p:spTree>
+      <p:nvGrpSpPr>
+        <p:cNvPr id="1" name="Shape 445"/>
+        <p:cNvGrpSpPr/>
+        <p:nvPr/>
+      </p:nvGrpSpPr>
+      <p:grpSpPr>
+        <a:xfrm>
+          <a:off x="0" y="0"/>
+          <a:ext cx="0" cy="0"/>
+          <a:chOff x="0" y="0"/>
+          <a:chExt cx="0" cy="0"/>
+        </a:xfrm>
+      </p:grpSpPr>
+      <p:sp>
+        <p:nvSpPr>
           <p:cNvPr id="449" name="Google Shape;449;p29"/>
           <p:cNvSpPr txBox="1">
             <a:spLocks noGrp="1"/>
@@ -43832,294 +44485,6 @@
     <p:extLst>
       <p:ext uri="{BB962C8B-B14F-4D97-AF65-F5344CB8AC3E}">
         <p14:creationId xmlns:p14="http://schemas.microsoft.com/office/powerpoint/2010/main" val="516886351"/>
-      </p:ext>
-    </p:extLst>
-  </p:cSld>
-  <p:clrMapOvr>
-    <a:masterClrMapping/>
-  </p:clrMapOvr>
-</p:sld>
-</file>
-
-<file path=ppt/slides/slide9.xml><?xml version="1.0" encoding="utf-8"?>
-<p:sld xmlns:a="http://schemas.openxmlformats.org/drawingml/2006/main" xmlns:r="http://schemas.openxmlformats.org/officeDocument/2006/relationships" xmlns:p="http://schemas.openxmlformats.org/presentationml/2006/main">
-  <p:cSld>
-    <p:spTree>
-      <p:nvGrpSpPr>
-        <p:cNvPr id="1" name="Shape 445"/>
-        <p:cNvGrpSpPr/>
-        <p:nvPr/>
-      </p:nvGrpSpPr>
-      <p:grpSpPr>
-        <a:xfrm>
-          <a:off x="0" y="0"/>
-          <a:ext cx="0" cy="0"/>
-          <a:chOff x="0" y="0"/>
-          <a:chExt cx="0" cy="0"/>
-        </a:xfrm>
-      </p:grpSpPr>
-      <p:sp>
-        <p:nvSpPr>
-          <p:cNvPr id="447" name="Google Shape;447;p29"/>
-          <p:cNvSpPr/>
-          <p:nvPr/>
-        </p:nvSpPr>
-        <p:spPr>
-          <a:xfrm rot="10800000">
-            <a:off x="5218442" y="1801936"/>
-            <a:ext cx="3267278" cy="1307024"/>
-          </a:xfrm>
-          <a:prstGeom prst="homePlate">
-            <a:avLst>
-              <a:gd name="adj" fmla="val 50000"/>
-            </a:avLst>
-          </a:prstGeom>
-          <a:solidFill>
-            <a:schemeClr val="accent1"/>
-          </a:solidFill>
-          <a:ln>
-            <a:noFill/>
-          </a:ln>
-        </p:spPr>
-        <p:txBody>
-          <a:bodyPr spcFirstLastPara="1" wrap="square" lIns="91425" tIns="91425" rIns="91425" bIns="91425" anchor="ctr" anchorCtr="0">
-            <a:noAutofit/>
-          </a:bodyPr>
-          <a:lstStyle/>
-          <a:p>
-            <a:pPr marL="0" lvl="0" indent="0" algn="l" rtl="0">
-              <a:spcBef>
-                <a:spcPts val="0"/>
-              </a:spcBef>
-              <a:spcAft>
-                <a:spcPts val="0"/>
-              </a:spcAft>
-              <a:buNone/>
-            </a:pPr>
-            <a:endParaRPr/>
-          </a:p>
-        </p:txBody>
-      </p:sp>
-      <p:sp>
-        <p:nvSpPr>
-          <p:cNvPr id="449" name="Google Shape;449;p29"/>
-          <p:cNvSpPr txBox="1">
-            <a:spLocks noGrp="1"/>
-          </p:cNvSpPr>
-          <p:nvPr>
-            <p:ph type="ctrTitle" idx="4"/>
-          </p:nvPr>
-        </p:nvSpPr>
-        <p:spPr>
-          <a:xfrm>
-            <a:off x="256200" y="637927"/>
-            <a:ext cx="7833900" cy="606600"/>
-          </a:xfrm>
-          <a:prstGeom prst="rect">
-            <a:avLst/>
-          </a:prstGeom>
-        </p:spPr>
-        <p:txBody>
-          <a:bodyPr spcFirstLastPara="1" wrap="square" lIns="91425" tIns="91425" rIns="91425" bIns="91425" anchor="b" anchorCtr="0">
-            <a:noAutofit/>
-          </a:bodyPr>
-          <a:lstStyle/>
-          <a:p>
-            <a:pPr marL="0" lvl="0" indent="0" algn="r" rtl="0">
-              <a:spcBef>
-                <a:spcPts val="0"/>
-              </a:spcBef>
-              <a:spcAft>
-                <a:spcPts val="0"/>
-              </a:spcAft>
-              <a:buNone/>
-            </a:pPr>
-            <a:r>
-              <a:rPr lang="es" dirty="0">
-                <a:solidFill>
-                  <a:srgbClr val="FFFFFF"/>
-                </a:solidFill>
-              </a:rPr>
-              <a:t>About Me Page</a:t>
-            </a:r>
-            <a:endParaRPr dirty="0">
-              <a:solidFill>
-                <a:srgbClr val="FFFFFF"/>
-              </a:solidFill>
-            </a:endParaRPr>
-          </a:p>
-        </p:txBody>
-      </p:sp>
-      <p:cxnSp>
-        <p:nvCxnSpPr>
-          <p:cNvPr id="458" name="Google Shape;458;p29"/>
-          <p:cNvCxnSpPr/>
-          <p:nvPr/>
-        </p:nvCxnSpPr>
-        <p:spPr>
-          <a:xfrm>
-            <a:off x="5882725" y="1195336"/>
-            <a:ext cx="3340500" cy="0"/>
-          </a:xfrm>
-          <a:prstGeom prst="straightConnector1">
-            <a:avLst/>
-          </a:prstGeom>
-          <a:noFill/>
-          <a:ln w="9525" cap="flat" cmpd="sng">
-            <a:solidFill>
-              <a:schemeClr val="accent1"/>
-            </a:solidFill>
-            <a:prstDash val="solid"/>
-            <a:round/>
-            <a:headEnd type="none" w="med" len="med"/>
-            <a:tailEnd type="none" w="med" len="med"/>
-          </a:ln>
-        </p:spPr>
-      </p:cxnSp>
-      <p:sp>
-        <p:nvSpPr>
-          <p:cNvPr id="558" name="Google Shape;558;p29"/>
-          <p:cNvSpPr txBox="1">
-            <a:spLocks noGrp="1"/>
-          </p:cNvSpPr>
-          <p:nvPr>
-            <p:ph type="ctrTitle" idx="3"/>
-          </p:nvPr>
-        </p:nvSpPr>
-        <p:spPr>
-          <a:xfrm>
-            <a:off x="6014100" y="2571750"/>
-            <a:ext cx="2076000" cy="196200"/>
-          </a:xfrm>
-          <a:prstGeom prst="rect">
-            <a:avLst/>
-          </a:prstGeom>
-        </p:spPr>
-        <p:txBody>
-          <a:bodyPr spcFirstLastPara="1" wrap="square" lIns="91425" tIns="91425" rIns="91425" bIns="91425" anchor="b" anchorCtr="0">
-            <a:noAutofit/>
-          </a:bodyPr>
-          <a:lstStyle/>
-          <a:p>
-            <a:pPr marL="0" lvl="0" indent="0" algn="l" rtl="0">
-              <a:spcBef>
-                <a:spcPts val="0"/>
-              </a:spcBef>
-              <a:spcAft>
-                <a:spcPts val="0"/>
-              </a:spcAft>
-              <a:buNone/>
-            </a:pPr>
-            <a:r>
-              <a:rPr lang="en-US" dirty="0">
-                <a:solidFill>
-                  <a:srgbClr val="0E2A47"/>
-                </a:solidFill>
-              </a:rPr>
-              <a:t>This page is my portfolio, It has all the important information about me </a:t>
-            </a:r>
-            <a:endParaRPr dirty="0">
-              <a:solidFill>
-                <a:srgbClr val="0E2A47"/>
-              </a:solidFill>
-            </a:endParaRPr>
-          </a:p>
-        </p:txBody>
-      </p:sp>
-      <p:pic>
-        <p:nvPicPr>
-          <p:cNvPr id="3" name="Picture 2">
-            <a:extLst>
-              <a:ext uri="{FF2B5EF4-FFF2-40B4-BE49-F238E27FC236}">
-                <a16:creationId xmlns:a16="http://schemas.microsoft.com/office/drawing/2014/main" id="{587C05D7-747A-DD6E-8E4D-F9A3D1E32CA4}"/>
-              </a:ext>
-            </a:extLst>
-          </p:cNvPr>
-          <p:cNvPicPr>
-            <a:picLocks noChangeAspect="1"/>
-          </p:cNvPicPr>
-          <p:nvPr/>
-        </p:nvPicPr>
-        <p:blipFill>
-          <a:blip r:embed="rId3"/>
-          <a:stretch>
-            <a:fillRect/>
-          </a:stretch>
-        </p:blipFill>
-        <p:spPr>
-          <a:xfrm>
-            <a:off x="256200" y="95943"/>
-            <a:ext cx="3957060" cy="1933823"/>
-          </a:xfrm>
-          <a:prstGeom prst="rect">
-            <a:avLst/>
-          </a:prstGeom>
-        </p:spPr>
-      </p:pic>
-      <p:pic>
-        <p:nvPicPr>
-          <p:cNvPr id="5" name="Picture 4">
-            <a:extLst>
-              <a:ext uri="{FF2B5EF4-FFF2-40B4-BE49-F238E27FC236}">
-                <a16:creationId xmlns:a16="http://schemas.microsoft.com/office/drawing/2014/main" id="{F2F4F789-EC04-66A2-AB23-BBFB70A9DDA1}"/>
-              </a:ext>
-            </a:extLst>
-          </p:cNvPr>
-          <p:cNvPicPr>
-            <a:picLocks noChangeAspect="1"/>
-          </p:cNvPicPr>
-          <p:nvPr/>
-        </p:nvPicPr>
-        <p:blipFill>
-          <a:blip r:embed="rId4"/>
-          <a:stretch>
-            <a:fillRect/>
-          </a:stretch>
-        </p:blipFill>
-        <p:spPr>
-          <a:xfrm>
-            <a:off x="256200" y="2029766"/>
-            <a:ext cx="3957060" cy="1947290"/>
-          </a:xfrm>
-          <a:prstGeom prst="rect">
-            <a:avLst/>
-          </a:prstGeom>
-        </p:spPr>
-      </p:pic>
-      <p:pic>
-        <p:nvPicPr>
-          <p:cNvPr id="7" name="Picture 6">
-            <a:extLst>
-              <a:ext uri="{FF2B5EF4-FFF2-40B4-BE49-F238E27FC236}">
-                <a16:creationId xmlns:a16="http://schemas.microsoft.com/office/drawing/2014/main" id="{2DAC0BE9-9D04-4DC5-D01F-A3061FA788BA}"/>
-              </a:ext>
-            </a:extLst>
-          </p:cNvPr>
-          <p:cNvPicPr>
-            <a:picLocks noChangeAspect="1"/>
-          </p:cNvPicPr>
-          <p:nvPr/>
-        </p:nvPicPr>
-        <p:blipFill>
-          <a:blip r:embed="rId5"/>
-          <a:stretch>
-            <a:fillRect/>
-          </a:stretch>
-        </p:blipFill>
-        <p:spPr>
-          <a:xfrm>
-            <a:off x="256200" y="3946598"/>
-            <a:ext cx="3957060" cy="1144260"/>
-          </a:xfrm>
-          <a:prstGeom prst="rect">
-            <a:avLst/>
-          </a:prstGeom>
-        </p:spPr>
-      </p:pic>
-    </p:spTree>
-    <p:extLst>
-      <p:ext uri="{BB962C8B-B14F-4D97-AF65-F5344CB8AC3E}">
-        <p14:creationId xmlns:p14="http://schemas.microsoft.com/office/powerpoint/2010/main" val="1517527258"/>
       </p:ext>
     </p:extLst>
   </p:cSld>

</xml_diff>